<commit_message>
correct misspelling in slide
</commit_message>
<xml_diff>
--- a/Slides/FlySimExpress-WalkIn.pptx
+++ b/Slides/FlySimExpress-WalkIn.pptx
@@ -199,7 +199,7 @@
           <a:p>
             <a:fld id="{7D8BC5A3-CBF8-4111-8D50-41C5785EF03A}" type="datetimeFigureOut">
               <a:rPr lang="en-US" smtClean="0"/>
-              <a:t>3/2/2018</a:t>
+              <a:t>3/24/2018</a:t>
             </a:fld>
             <a:endParaRPr lang="en-US"/>
           </a:p>
@@ -873,7 +873,7 @@
           <a:p>
             <a:fld id="{2982344A-2861-486C-9BC1-6513247352FB}" type="datetimeFigureOut">
               <a:rPr lang="en-US" smtClean="0"/>
-              <a:t>3/2/2018</a:t>
+              <a:t>3/24/2018</a:t>
             </a:fld>
             <a:endParaRPr lang="en-US"/>
           </a:p>
@@ -1095,7 +1095,7 @@
           <a:p>
             <a:fld id="{D1098AC1-A2C1-491D-8C6D-90156C1B421C}" type="datetimeFigureOut">
               <a:rPr lang="en-US" smtClean="0"/>
-              <a:t>3/2/2018</a:t>
+              <a:t>3/24/2018</a:t>
             </a:fld>
             <a:endParaRPr lang="en-US"/>
           </a:p>
@@ -1327,7 +1327,7 @@
           <a:p>
             <a:fld id="{D1098AC1-A2C1-491D-8C6D-90156C1B421C}" type="datetimeFigureOut">
               <a:rPr lang="en-US" smtClean="0"/>
-              <a:t>3/2/2018</a:t>
+              <a:t>3/24/2018</a:t>
             </a:fld>
             <a:endParaRPr lang="en-US"/>
           </a:p>
@@ -7193,7 +7193,7 @@
           <a:p>
             <a:fld id="{2982344A-2861-486C-9BC1-6513247352FB}" type="datetimeFigureOut">
               <a:rPr lang="en-US" smtClean="0"/>
-              <a:t>3/2/2018</a:t>
+              <a:t>3/24/2018</a:t>
             </a:fld>
             <a:endParaRPr lang="en-US"/>
           </a:p>
@@ -7492,7 +7492,7 @@
           <a:p>
             <a:fld id="{D1098AC1-A2C1-491D-8C6D-90156C1B421C}" type="datetimeFigureOut">
               <a:rPr lang="en-US" smtClean="0"/>
-              <a:t>3/2/2018</a:t>
+              <a:t>3/24/2018</a:t>
             </a:fld>
             <a:endParaRPr lang="en-US"/>
           </a:p>
@@ -7781,7 +7781,7 @@
           <a:p>
             <a:fld id="{D1098AC1-A2C1-491D-8C6D-90156C1B421C}" type="datetimeFigureOut">
               <a:rPr lang="en-US" smtClean="0"/>
-              <a:t>3/2/2018</a:t>
+              <a:t>3/24/2018</a:t>
             </a:fld>
             <a:endParaRPr lang="en-US"/>
           </a:p>
@@ -8217,7 +8217,7 @@
           <a:p>
             <a:fld id="{D1098AC1-A2C1-491D-8C6D-90156C1B421C}" type="datetimeFigureOut">
               <a:rPr lang="en-US" smtClean="0"/>
-              <a:t>3/2/2018</a:t>
+              <a:t>3/24/2018</a:t>
             </a:fld>
             <a:endParaRPr lang="en-US"/>
           </a:p>
@@ -8382,7 +8382,7 @@
           <a:p>
             <a:fld id="{2982344A-2861-486C-9BC1-6513247352FB}" type="datetimeFigureOut">
               <a:rPr lang="en-US" smtClean="0"/>
-              <a:t>3/2/2018</a:t>
+              <a:t>3/24/2018</a:t>
             </a:fld>
             <a:endParaRPr lang="en-US"/>
           </a:p>
@@ -8519,7 +8519,7 @@
           <a:p>
             <a:fld id="{2982344A-2861-486C-9BC1-6513247352FB}" type="datetimeFigureOut">
               <a:rPr lang="en-US" smtClean="0"/>
-              <a:t>3/2/2018</a:t>
+              <a:t>3/24/2018</a:t>
             </a:fld>
             <a:endParaRPr lang="en-US"/>
           </a:p>
@@ -8854,7 +8854,7 @@
           <a:p>
             <a:fld id="{AF6E2C9B-5FA2-460D-9BE7-B0812FC2A6FF}" type="datetimeFigureOut">
               <a:rPr lang="en-US" smtClean="0"/>
-              <a:t>3/2/2018</a:t>
+              <a:t>3/24/2018</a:t>
             </a:fld>
             <a:endParaRPr lang="en-US" dirty="0"/>
           </a:p>
@@ -9170,7 +9170,7 @@
           <a:p>
             <a:fld id="{D1098AC1-A2C1-491D-8C6D-90156C1B421C}" type="datetimeFigureOut">
               <a:rPr lang="en-US" smtClean="0"/>
-              <a:t>3/2/2018</a:t>
+              <a:t>3/24/2018</a:t>
             </a:fld>
             <a:endParaRPr lang="en-US"/>
           </a:p>
@@ -13786,11 +13786,11 @@
   <p:clrMapOvr>
     <a:masterClrMapping/>
   </p:clrMapOvr>
-  <mc:AlternateContent xmlns:mc="http://schemas.openxmlformats.org/markup-compatibility/2006">
-    <mc:Choice xmlns:p14="http://schemas.microsoft.com/office/powerpoint/2010/main" Requires="p14">
+  <mc:AlternateContent xmlns:mc="http://schemas.openxmlformats.org/markup-compatibility/2006" xmlns:p14="http://schemas.microsoft.com/office/powerpoint/2010/main">
+    <mc:Choice Requires="p14">
       <p:transition spd="slow" p14:dur="2000" advTm="10000"/>
     </mc:Choice>
-    <mc:Fallback>
+    <mc:Fallback xmlns="">
       <p:transition spd="slow" advTm="10000"/>
     </mc:Fallback>
   </mc:AlternateContent>
@@ -13925,11 +13925,11 @@
   <p:clrMapOvr>
     <a:masterClrMapping/>
   </p:clrMapOvr>
-  <mc:AlternateContent xmlns:mc="http://schemas.openxmlformats.org/markup-compatibility/2006">
-    <mc:Choice xmlns:p14="http://schemas.microsoft.com/office/powerpoint/2010/main" Requires="p14">
+  <mc:AlternateContent xmlns:mc="http://schemas.openxmlformats.org/markup-compatibility/2006" xmlns:p14="http://schemas.microsoft.com/office/powerpoint/2010/main">
+    <mc:Choice Requires="p14">
       <p:transition spd="slow" p14:dur="2000" advTm="10000"/>
     </mc:Choice>
-    <mc:Fallback>
+    <mc:Fallback xmlns="">
       <p:transition spd="slow" advTm="10000"/>
     </mc:Fallback>
   </mc:AlternateContent>
@@ -14116,8 +14116,12 @@
               </a:spcAft>
             </a:pPr>
             <a:r>
+              <a:rPr lang="en-US" sz="1400" b="1" i="1"/>
+              <a:t>We go </a:t>
+            </a:r>
+            <a:r>
               <a:rPr lang="en-US" sz="1400" b="1" i="1" dirty="0"/>
-              <a:t>We got to a lot of effort to make these, please help make them available to future attendees! </a:t>
+              <a:t>to a lot of effort to make these, please help make them available to future attendees! </a:t>
             </a:r>
             <a:endParaRPr lang="en-US" sz="1100" b="1" i="1" dirty="0"/>
           </a:p>
@@ -14157,11 +14161,11 @@
   <p:clrMapOvr>
     <a:masterClrMapping/>
   </p:clrMapOvr>
-  <mc:AlternateContent xmlns:mc="http://schemas.openxmlformats.org/markup-compatibility/2006">
-    <mc:Choice xmlns:p14="http://schemas.microsoft.com/office/powerpoint/2010/main" Requires="p14">
+  <mc:AlternateContent xmlns:mc="http://schemas.openxmlformats.org/markup-compatibility/2006" xmlns:p14="http://schemas.microsoft.com/office/powerpoint/2010/main">
+    <mc:Choice Requires="p14">
       <p:transition spd="slow" p14:dur="2000" advTm="10000"/>
     </mc:Choice>
-    <mc:Fallback>
+    <mc:Fallback xmlns="">
       <p:transition spd="slow" advTm="10000"/>
     </mc:Fallback>
   </mc:AlternateContent>
@@ -14885,21 +14889,21 @@
 </file>
 
 <file path=customXml/item2.xml><?xml version="1.0" encoding="utf-8"?>
+<?mso-contentType ?>
+<FormTemplates xmlns="http://schemas.microsoft.com/sharepoint/v3/contenttype/forms">
+  <Display>DocumentLibraryForm</Display>
+  <Edit>DocumentLibraryForm</Edit>
+  <New>DocumentLibraryForm</New>
+</FormTemplates>
+</file>
+
+<file path=customXml/item3.xml><?xml version="1.0" encoding="utf-8"?>
 <p:properties xmlns:p="http://schemas.microsoft.com/office/2006/metadata/properties" xmlns:xsi="http://www.w3.org/2001/XMLSchema-instance" xmlns:pc="http://schemas.microsoft.com/office/infopath/2007/PartnerControls">
   <documentManagement>
     <_ip_UnifiedCompliancePolicyUIAction xmlns="http://schemas.microsoft.com/sharepoint/v3" xsi:nil="true"/>
     <_ip_UnifiedCompliancePolicyProperties xmlns="http://schemas.microsoft.com/sharepoint/v3" xsi:nil="true"/>
   </documentManagement>
 </p:properties>
-</file>
-
-<file path=customXml/item3.xml><?xml version="1.0" encoding="utf-8"?>
-<?mso-contentType ?>
-<FormTemplates xmlns="http://schemas.microsoft.com/sharepoint/v3/contenttype/forms">
-  <Display>DocumentLibraryForm</Display>
-  <Edit>DocumentLibraryForm</Edit>
-  <New>DocumentLibraryForm</New>
-</FormTemplates>
 </file>
 
 <file path=customXml/itemProps1.xml><?xml version="1.0" encoding="utf-8"?>
@@ -14923,6 +14927,14 @@
 </file>
 
 <file path=customXml/itemProps2.xml><?xml version="1.0" encoding="utf-8"?>
+<ds:datastoreItem xmlns:ds="http://schemas.openxmlformats.org/officeDocument/2006/customXml" ds:itemID="{9FA23AD3-B000-48AC-BD64-6AD70248D43F}">
+  <ds:schemaRefs>
+    <ds:schemaRef ds:uri="http://schemas.microsoft.com/sharepoint/v3/contenttype/forms"/>
+  </ds:schemaRefs>
+</ds:datastoreItem>
+</file>
+
+<file path=customXml/itemProps3.xml><?xml version="1.0" encoding="utf-8"?>
 <ds:datastoreItem xmlns:ds="http://schemas.openxmlformats.org/officeDocument/2006/customXml" ds:itemID="{F914B0B6-D9E4-4121-B608-CD036B749B60}">
   <ds:schemaRefs>
     <ds:schemaRef ds:uri="http://purl.org/dc/elements/1.1/"/>
@@ -14938,12 +14950,4 @@
     <ds:schemaRef ds:uri="http://purl.org/dc/dcmitype/"/>
   </ds:schemaRefs>
 </ds:datastoreItem>
-</file>
-
-<file path=customXml/itemProps3.xml><?xml version="1.0" encoding="utf-8"?>
-<ds:datastoreItem xmlns:ds="http://schemas.openxmlformats.org/officeDocument/2006/customXml" ds:itemID="{9FA23AD3-B000-48AC-BD64-6AD70248D43F}">
-  <ds:schemaRefs>
-    <ds:schemaRef ds:uri="http://schemas.microsoft.com/sharepoint/v3/contenttype/forms"/>
-  </ds:schemaRefs>
-</ds:datastoreItem>
 </file>
</xml_diff>